<commit_message>
2014 Summer - Changed assignments to reflect double-time.
</commit_message>
<xml_diff>
--- a/Exercises & Assignments/Design-hosting/Hosting.pptx
+++ b/Exercises & Assignments/Design-hosting/Hosting.pptx
@@ -206,7 +206,7 @@
           <a:p>
             <a:fld id="{9ED002D6-8D2A-604A-AFAC-C3F5FC4DA7C4}" type="datetimeFigureOut">
               <a:rPr lang="en-US" smtClean="0"/>
-              <a:t>1/22/14</a:t>
+              <a:t>6/16/14</a:t>
             </a:fld>
             <a:endParaRPr lang="en-US"/>
           </a:p>
@@ -1120,7 +1120,7 @@
             <a:fld id="{451DEABC-D766-4322-8E78-B830FAE35C72}" type="datetime4">
               <a:rPr lang="en-US" smtClean="0"/>
               <a:pPr/>
-              <a:t>January 22, 2014</a:t>
+              <a:t>June 16, 2014</a:t>
             </a:fld>
             <a:endParaRPr lang="en-US" dirty="0"/>
           </a:p>
@@ -1387,7 +1387,7 @@
             <a:fld id="{F3131F9E-604E-4343-9F29-EF72E8231CAD}" type="datetime4">
               <a:rPr lang="en-US" smtClean="0"/>
               <a:pPr/>
-              <a:t>January 22, 2014</a:t>
+              <a:t>June 16, 2014</a:t>
             </a:fld>
             <a:endParaRPr lang="en-US"/>
           </a:p>
@@ -1564,7 +1564,7 @@
             <a:fld id="{34A8E1CE-37F8-4102-8DF9-852A0A51F293}" type="datetime4">
               <a:rPr lang="en-US" smtClean="0"/>
               <a:pPr/>
-              <a:t>January 22, 2014</a:t>
+              <a:t>June 16, 2014</a:t>
             </a:fld>
             <a:endParaRPr lang="en-US"/>
           </a:p>
@@ -1731,7 +1731,7 @@
             <a:fld id="{93333F43-3E86-47E4-BFBB-2476D384E1C6}" type="datetime4">
               <a:rPr lang="en-US" smtClean="0"/>
               <a:pPr/>
-              <a:t>January 22, 2014</a:t>
+              <a:t>June 16, 2014</a:t>
             </a:fld>
             <a:endParaRPr lang="en-US"/>
           </a:p>
@@ -1982,7 +1982,7 @@
             <a:fld id="{751663BA-01FC-4367-B6F3-ABB2645D55F1}" type="datetime4">
               <a:rPr lang="en-US" smtClean="0"/>
               <a:pPr/>
-              <a:t>January 22, 2014</a:t>
+              <a:t>June 16, 2014</a:t>
             </a:fld>
             <a:endParaRPr lang="en-US" dirty="0"/>
           </a:p>
@@ -2267,7 +2267,7 @@
             <a:fld id="{79B19C71-EC74-44AF-B27E-FC7DC3C3A61D}" type="datetime4">
               <a:rPr lang="en-US" smtClean="0"/>
               <a:pPr/>
-              <a:t>January 22, 2014</a:t>
+              <a:t>June 16, 2014</a:t>
             </a:fld>
             <a:endParaRPr lang="en-US"/>
           </a:p>
@@ -2708,7 +2708,7 @@
             <a:fld id="{6A5CDA29-3CBE-48EA-92AE-A996835462BA}" type="datetime4">
               <a:rPr lang="en-US" smtClean="0"/>
               <a:pPr/>
-              <a:t>January 22, 2014</a:t>
+              <a:t>June 16, 2014</a:t>
             </a:fld>
             <a:endParaRPr lang="en-US"/>
           </a:p>
@@ -2823,7 +2823,7 @@
             <a:fld id="{E29EC054-3869-4501-B163-1BBFDE8DCE04}" type="datetime4">
               <a:rPr lang="en-US" smtClean="0"/>
               <a:pPr/>
-              <a:t>January 22, 2014</a:t>
+              <a:t>June 16, 2014</a:t>
             </a:fld>
             <a:endParaRPr lang="en-US"/>
           </a:p>
@@ -2915,7 +2915,7 @@
             <a:fld id="{0A63D831-56C1-49CF-8EF7-8B9A98402BCD}" type="datetime4">
               <a:rPr lang="en-US" smtClean="0"/>
               <a:pPr/>
-              <a:t>January 22, 2014</a:t>
+              <a:t>June 16, 2014</a:t>
             </a:fld>
             <a:endParaRPr lang="en-US"/>
           </a:p>
@@ -3159,7 +3159,7 @@
             <a:fld id="{6EAD5615-7F4F-4584-84D5-CC95918C321F}" type="datetime4">
               <a:rPr lang="en-US" smtClean="0"/>
               <a:pPr/>
-              <a:t>January 22, 2014</a:t>
+              <a:t>June 16, 2014</a:t>
             </a:fld>
             <a:endParaRPr lang="en-US"/>
           </a:p>
@@ -3455,7 +3455,7 @@
             <a:fld id="{76EEA923-9BEE-48CE-9F28-5B525F399BAD}" type="datetime4">
               <a:rPr lang="en-US" smtClean="0"/>
               <a:pPr/>
-              <a:t>January 22, 2014</a:t>
+              <a:t>June 16, 2014</a:t>
             </a:fld>
             <a:endParaRPr lang="en-US"/>
           </a:p>
@@ -3751,7 +3751,7 @@
             <a:fld id="{17D0EFEE-2756-4A20-BF2A-63F0A94F99AC}" type="datetime4">
               <a:rPr lang="en-US" smtClean="0"/>
               <a:pPr/>
-              <a:t>January 22, 2014</a:t>
+              <a:t>June 16, 2014</a:t>
             </a:fld>
             <a:endParaRPr lang="en-US" dirty="0"/>
           </a:p>
@@ -4692,41 +4692,85 @@
             <p:ph idx="1"/>
           </p:nvPr>
         </p:nvSpPr>
-        <p:spPr/>
-        <p:txBody>
-          <a:bodyPr/>
-          <a:lstStyle/>
-          <a:p>
+        <p:spPr>
+          <a:xfrm>
+            <a:off x="1798320" y="1610361"/>
+            <a:ext cx="5791200" cy="716280"/>
+          </a:xfrm>
+        </p:spPr>
+        <p:txBody>
+          <a:bodyPr/>
+          <a:lstStyle/>
+          <a:p>
+            <a:pPr algn="ctr"/>
             <a:r>
               <a:rPr lang="en-US" dirty="0" smtClean="0"/>
-              <a:t>&lt;Insert </a:t>
-            </a:r>
-            <a:r>
-              <a:rPr lang="en-US" dirty="0" err="1" smtClean="0"/>
-              <a:t>hostgator</a:t>
-            </a:r>
-            <a:r>
-              <a:rPr lang="en-US" dirty="0" smtClean="0"/>
-              <a:t> login screen here.&gt;</a:t>
-            </a:r>
-          </a:p>
-          <a:p>
-            <a:r>
-              <a:rPr lang="en-US" dirty="0" smtClean="0"/>
-              <a:t>&lt;insert </a:t>
-            </a:r>
-            <a:r>
-              <a:rPr lang="en-US" dirty="0" err="1" smtClean="0"/>
-              <a:t>cpanel</a:t>
-            </a:r>
-            <a:r>
-              <a:rPr lang="en-US" dirty="0" smtClean="0"/>
-              <a:t> success page&gt;</a:t>
-            </a:r>
-            <a:endParaRPr lang="en-US" dirty="0"/>
-          </a:p>
-        </p:txBody>
-      </p:sp>
+              <a:t>Hosting control panel login</a:t>
+            </a:r>
+            <a:endParaRPr lang="en-US" dirty="0" smtClean="0"/>
+          </a:p>
+        </p:txBody>
+      </p:sp>
+      <p:pic>
+        <p:nvPicPr>
+          <p:cNvPr id="3" name="Picture 2" descr="cpanel-login.png"/>
+          <p:cNvPicPr>
+            <a:picLocks noChangeAspect="1"/>
+          </p:cNvPicPr>
+          <p:nvPr/>
+        </p:nvPicPr>
+        <p:blipFill>
+          <a:blip r:embed="rId2">
+            <a:extLst>
+              <a:ext uri="{28A0092B-C50C-407E-A947-70E740481C1C}">
+                <a14:useLocalDpi xmlns:a14="http://schemas.microsoft.com/office/drawing/2010/main" val="0"/>
+              </a:ext>
+            </a:extLst>
+          </a:blip>
+          <a:stretch>
+            <a:fillRect/>
+          </a:stretch>
+        </p:blipFill>
+        <p:spPr>
+          <a:xfrm>
+            <a:off x="101600" y="2232117"/>
+            <a:ext cx="4958080" cy="3630203"/>
+          </a:xfrm>
+          <a:prstGeom prst="rect">
+            <a:avLst/>
+          </a:prstGeom>
+        </p:spPr>
+      </p:pic>
+      <p:pic>
+        <p:nvPicPr>
+          <p:cNvPr id="6" name="Picture 5" descr="Screen Shot 2014-06-16 at 8.34.36 PM.png"/>
+          <p:cNvPicPr>
+            <a:picLocks noChangeAspect="1"/>
+          </p:cNvPicPr>
+          <p:nvPr/>
+        </p:nvPicPr>
+        <p:blipFill>
+          <a:blip r:embed="rId3">
+            <a:extLst>
+              <a:ext uri="{28A0092B-C50C-407E-A947-70E740481C1C}">
+                <a14:useLocalDpi xmlns:a14="http://schemas.microsoft.com/office/drawing/2010/main" val="0"/>
+              </a:ext>
+            </a:extLst>
+          </a:blip>
+          <a:stretch>
+            <a:fillRect/>
+          </a:stretch>
+        </p:blipFill>
+        <p:spPr>
+          <a:xfrm>
+            <a:off x="4693920" y="2232117"/>
+            <a:ext cx="4185920" cy="4280103"/>
+          </a:xfrm>
+          <a:prstGeom prst="rect">
+            <a:avLst/>
+          </a:prstGeom>
+        </p:spPr>
+      </p:pic>
     </p:spTree>
     <p:extLst>
       <p:ext uri="{BB962C8B-B14F-4D97-AF65-F5344CB8AC3E}">

</xml_diff>